<commit_message>
abad zijn fouten verbeterd deel 1
</commit_message>
<xml_diff>
--- a/Presentaties/4Wekelijkse PowerPoint/ppt_enocean.pptx
+++ b/Presentaties/4Wekelijkse PowerPoint/ppt_enocean.pptx
@@ -5,7 +5,7 @@
     <p:sldMasterId id="2147483666" r:id="rId1"/>
   </p:sldMasterIdLst>
   <p:notesMasterIdLst>
-    <p:notesMasterId r:id="rId8"/>
+    <p:notesMasterId r:id="rId9"/>
   </p:notesMasterIdLst>
   <p:sldIdLst>
     <p:sldId id="256" r:id="rId2"/>
@@ -13,23 +13,20 @@
     <p:sldId id="287" r:id="rId4"/>
     <p:sldId id="288" r:id="rId5"/>
     <p:sldId id="289" r:id="rId6"/>
-    <p:sldId id="286" r:id="rId7"/>
+    <p:sldId id="290" r:id="rId7"/>
+    <p:sldId id="286" r:id="rId8"/>
   </p:sldIdLst>
   <p:sldSz cx="9144000" cy="5143500" type="screen16x9"/>
   <p:notesSz cx="6858000" cy="9144000"/>
   <p:embeddedFontLst>
     <p:embeddedFont>
-      <p:font typeface="Dosis ExtraLight" panose="020B0604020202020204" charset="0"/>
-      <p:regular r:id="rId9"/>
-      <p:bold r:id="rId10"/>
+      <p:font typeface="Abel" panose="020B0604020202020204" charset="0"/>
+      <p:regular r:id="rId10"/>
     </p:embeddedFont>
     <p:embeddedFont>
-      <p:font typeface="Staatliches" panose="020B0604020202020204" charset="0"/>
+      <p:font typeface="Dosis ExtraLight" panose="020B0604020202020204" charset="0"/>
       <p:regular r:id="rId11"/>
-    </p:embeddedFont>
-    <p:embeddedFont>
-      <p:font typeface="Abel" panose="020B0604020202020204" charset="0"/>
-      <p:regular r:id="rId12"/>
+      <p:bold r:id="rId12"/>
     </p:embeddedFont>
     <p:embeddedFont>
       <p:font typeface="Fira Sans Condensed ExtraLight" panose="020B0604020202020204" charset="0"/>
@@ -44,6 +41,10 @@
       <p:bold r:id="rId18"/>
       <p:italic r:id="rId19"/>
       <p:boldItalic r:id="rId20"/>
+    </p:embeddedFont>
+    <p:embeddedFont>
+      <p:font typeface="Staatliches" panose="020B0604020202020204" charset="0"/>
+      <p:regular r:id="rId21"/>
     </p:embeddedFont>
   </p:embeddedFontLst>
   <p:defaultTextStyle>
@@ -1306,6 +1307,115 @@
     <p:extLst>
       <p:ext uri="{BB962C8B-B14F-4D97-AF65-F5344CB8AC3E}">
         <p14:creationId xmlns:p14="http://schemas.microsoft.com/office/powerpoint/2010/main" val="50827398"/>
+      </p:ext>
+    </p:extLst>
+  </p:cSld>
+  <p:clrMapOvr>
+    <a:masterClrMapping/>
+  </p:clrMapOvr>
+</p:notes>
+</file>
+
+<file path=ppt/notesSlides/notesSlide6.xml><?xml version="1.0" encoding="utf-8"?>
+<p:notes xmlns:a="http://schemas.openxmlformats.org/drawingml/2006/main" xmlns:r="http://schemas.openxmlformats.org/officeDocument/2006/relationships" xmlns:p="http://schemas.openxmlformats.org/presentationml/2006/main" showMasterSp="0" showMasterPhAnim="0">
+  <p:cSld>
+    <p:spTree>
+      <p:nvGrpSpPr>
+        <p:cNvPr id="1" name="Shape 313"/>
+        <p:cNvGrpSpPr/>
+        <p:nvPr/>
+      </p:nvGrpSpPr>
+      <p:grpSpPr>
+        <a:xfrm>
+          <a:off x="0" y="0"/>
+          <a:ext cx="0" cy="0"/>
+          <a:chOff x="0" y="0"/>
+          <a:chExt cx="0" cy="0"/>
+        </a:xfrm>
+      </p:grpSpPr>
+      <p:sp>
+        <p:nvSpPr>
+          <p:cNvPr id="314" name="Google Shape;314;g61854c95cc_0_218:notes"/>
+          <p:cNvSpPr>
+            <a:spLocks noGrp="1" noRot="1" noChangeAspect="1"/>
+          </p:cNvSpPr>
+          <p:nvPr>
+            <p:ph type="sldImg" idx="2"/>
+          </p:nvPr>
+        </p:nvSpPr>
+        <p:spPr>
+          <a:xfrm>
+            <a:off x="381000" y="685800"/>
+            <a:ext cx="6096000" cy="3429000"/>
+          </a:xfrm>
+          <a:custGeom>
+            <a:avLst/>
+            <a:gdLst/>
+            <a:ahLst/>
+            <a:cxnLst/>
+            <a:rect l="l" t="t" r="r" b="b"/>
+            <a:pathLst>
+              <a:path w="120000" h="120000" extrusionOk="0">
+                <a:moveTo>
+                  <a:pt x="0" y="0"/>
+                </a:moveTo>
+                <a:lnTo>
+                  <a:pt x="120000" y="0"/>
+                </a:lnTo>
+                <a:lnTo>
+                  <a:pt x="120000" y="120000"/>
+                </a:lnTo>
+                <a:lnTo>
+                  <a:pt x="0" y="120000"/>
+                </a:lnTo>
+                <a:close/>
+              </a:path>
+            </a:pathLst>
+          </a:custGeom>
+        </p:spPr>
+      </p:sp>
+      <p:sp>
+        <p:nvSpPr>
+          <p:cNvPr id="315" name="Google Shape;315;g61854c95cc_0_218:notes"/>
+          <p:cNvSpPr txBox="1">
+            <a:spLocks noGrp="1"/>
+          </p:cNvSpPr>
+          <p:nvPr>
+            <p:ph type="body" idx="1"/>
+          </p:nvPr>
+        </p:nvSpPr>
+        <p:spPr>
+          <a:xfrm>
+            <a:off x="685800" y="4343400"/>
+            <a:ext cx="5486400" cy="4114800"/>
+          </a:xfrm>
+          <a:prstGeom prst="rect">
+            <a:avLst/>
+          </a:prstGeom>
+        </p:spPr>
+        <p:txBody>
+          <a:bodyPr spcFirstLastPara="1" wrap="square" lIns="91425" tIns="91425" rIns="91425" bIns="91425" anchor="t" anchorCtr="0">
+            <a:noAutofit/>
+          </a:bodyPr>
+          <a:lstStyle/>
+          <a:p>
+            <a:pPr marL="0" lvl="0" indent="0" algn="l" rtl="0">
+              <a:spcBef>
+                <a:spcPts val="0"/>
+              </a:spcBef>
+              <a:spcAft>
+                <a:spcPts val="0"/>
+              </a:spcAft>
+              <a:buNone/>
+            </a:pPr>
+            <a:endParaRPr dirty="0"/>
+          </a:p>
+        </p:txBody>
+      </p:sp>
+    </p:spTree>
+    <p:extLst>
+      <p:ext uri="{BB962C8B-B14F-4D97-AF65-F5344CB8AC3E}">
+        <p14:creationId xmlns:p14="http://schemas.microsoft.com/office/powerpoint/2010/main" val="308108899"/>
       </p:ext>
     </p:extLst>
   </p:cSld>
@@ -5014,7 +5124,308 @@
             </a:pPr>
             <a:r>
               <a:rPr lang="nl-BE" dirty="0"/>
-              <a:t>Database</a:t>
+              <a:t>Database/ </a:t>
+            </a:r>
+            <a:r>
+              <a:rPr lang="nl-BE" dirty="0" err="1"/>
+              <a:t>nodered</a:t>
+            </a:r>
+            <a:endParaRPr dirty="0"/>
+          </a:p>
+        </p:txBody>
+      </p:sp>
+      <p:sp>
+        <p:nvSpPr>
+          <p:cNvPr id="8" name="Tekstvak 7">
+            <a:extLst>
+              <a:ext uri="{FF2B5EF4-FFF2-40B4-BE49-F238E27FC236}">
+                <a16:creationId xmlns:a16="http://schemas.microsoft.com/office/drawing/2014/main" id="{07FE98EE-60EE-4B0B-AFDB-515B4EB27F6C}"/>
+              </a:ext>
+            </a:extLst>
+          </p:cNvPr>
+          <p:cNvSpPr txBox="1"/>
+          <p:nvPr/>
+        </p:nvSpPr>
+        <p:spPr>
+          <a:xfrm>
+            <a:off x="0" y="4804946"/>
+            <a:ext cx="185531" cy="338554"/>
+          </a:xfrm>
+          <a:prstGeom prst="rect">
+            <a:avLst/>
+          </a:prstGeom>
+          <a:noFill/>
+        </p:spPr>
+        <p:txBody>
+          <a:bodyPr wrap="square" rtlCol="0">
+            <a:spAutoFit/>
+          </a:bodyPr>
+          <a:lstStyle/>
+          <a:p>
+            <a:r>
+              <a:rPr lang="nl-BE" sz="1600" dirty="0">
+                <a:solidFill>
+                  <a:srgbClr val="FFFFFF"/>
+                </a:solidFill>
+                <a:latin typeface="Dosis ExtraLight"/>
+                <a:sym typeface="Abel"/>
+              </a:rPr>
+              <a:t>5</a:t>
+            </a:r>
+          </a:p>
+        </p:txBody>
+      </p:sp>
+      <p:sp>
+        <p:nvSpPr>
+          <p:cNvPr id="5" name="Google Shape;318;p22">
+            <a:extLst>
+              <a:ext uri="{FF2B5EF4-FFF2-40B4-BE49-F238E27FC236}">
+                <a16:creationId xmlns:a16="http://schemas.microsoft.com/office/drawing/2014/main" id="{A041E4D3-B9CD-4984-943A-A6F2CBE92D34}"/>
+              </a:ext>
+            </a:extLst>
+          </p:cNvPr>
+          <p:cNvSpPr txBox="1">
+            <a:spLocks noGrp="1"/>
+          </p:cNvSpPr>
+          <p:nvPr>
+            <p:ph type="subTitle" idx="1"/>
+          </p:nvPr>
+        </p:nvSpPr>
+        <p:spPr>
+          <a:xfrm>
+            <a:off x="856200" y="1115677"/>
+            <a:ext cx="7670400" cy="3416400"/>
+          </a:xfrm>
+          <a:prstGeom prst="rect">
+            <a:avLst/>
+          </a:prstGeom>
+        </p:spPr>
+        <p:txBody>
+          <a:bodyPr spcFirstLastPara="1" wrap="square" lIns="91425" tIns="91425" rIns="91425" bIns="91425" anchor="t" anchorCtr="0">
+            <a:noAutofit/>
+          </a:bodyPr>
+          <a:lstStyle/>
+          <a:p>
+            <a:pPr marL="158750" lvl="0" indent="0">
+              <a:spcAft>
+                <a:spcPts val="600"/>
+              </a:spcAft>
+              <a:buClr>
+                <a:srgbClr val="FFFFFF"/>
+              </a:buClr>
+              <a:buSzPts val="1100"/>
+              <a:buNone/>
+            </a:pPr>
+            <a:endParaRPr lang="en-US" sz="1600" dirty="0">
+              <a:solidFill>
+                <a:srgbClr val="FFFFFF"/>
+              </a:solidFill>
+              <a:latin typeface="Dosis ExtraLight"/>
+              <a:ea typeface="Dosis ExtraLight"/>
+              <a:cs typeface="Dosis ExtraLight"/>
+              <a:sym typeface="Dosis ExtraLight"/>
+            </a:endParaRPr>
+          </a:p>
+          <a:p>
+            <a:pPr lvl="0">
+              <a:spcAft>
+                <a:spcPts val="600"/>
+              </a:spcAft>
+              <a:buClr>
+                <a:srgbClr val="FFFFFF"/>
+              </a:buClr>
+              <a:buSzPts val="1100"/>
+              <a:buFont typeface="Dosis ExtraLight"/>
+              <a:buChar char="●"/>
+            </a:pPr>
+            <a:r>
+              <a:rPr lang="en-US" sz="1600" dirty="0">
+                <a:solidFill>
+                  <a:srgbClr val="FFFFFF"/>
+                </a:solidFill>
+                <a:latin typeface="Dosis ExtraLight"/>
+                <a:ea typeface="Dosis ExtraLight"/>
+                <a:cs typeface="Dosis ExtraLight"/>
+                <a:sym typeface="Dosis ExtraLight"/>
+              </a:rPr>
+              <a:t>,,,</a:t>
+            </a:r>
+          </a:p>
+          <a:p>
+            <a:pPr lvl="0">
+              <a:spcAft>
+                <a:spcPts val="600"/>
+              </a:spcAft>
+              <a:buClr>
+                <a:srgbClr val="FFFFFF"/>
+              </a:buClr>
+              <a:buSzPts val="1100"/>
+              <a:buFont typeface="Dosis ExtraLight"/>
+              <a:buChar char="●"/>
+            </a:pPr>
+            <a:r>
+              <a:rPr lang="en-US" sz="1600" dirty="0">
+                <a:solidFill>
+                  <a:srgbClr val="FFFFFF"/>
+                </a:solidFill>
+                <a:latin typeface="Dosis ExtraLight"/>
+                <a:ea typeface="Dosis ExtraLight"/>
+                <a:cs typeface="Dosis ExtraLight"/>
+                <a:sym typeface="Dosis ExtraLight"/>
+              </a:rPr>
+              <a:t>,,,</a:t>
+            </a:r>
+          </a:p>
+          <a:p>
+            <a:pPr lvl="0">
+              <a:spcAft>
+                <a:spcPts val="600"/>
+              </a:spcAft>
+              <a:buClr>
+                <a:srgbClr val="FFFFFF"/>
+              </a:buClr>
+              <a:buSzPts val="1100"/>
+              <a:buFont typeface="Dosis ExtraLight"/>
+              <a:buChar char="●"/>
+            </a:pPr>
+            <a:r>
+              <a:rPr lang="en-US" sz="1600" dirty="0">
+                <a:solidFill>
+                  <a:srgbClr val="FFFFFF"/>
+                </a:solidFill>
+                <a:latin typeface="Dosis ExtraLight"/>
+                <a:ea typeface="Dosis ExtraLight"/>
+                <a:cs typeface="Dosis ExtraLight"/>
+                <a:sym typeface="Dosis ExtraLight"/>
+              </a:rPr>
+              <a:t>,,,</a:t>
+            </a:r>
+          </a:p>
+          <a:p>
+            <a:pPr lvl="0">
+              <a:spcAft>
+                <a:spcPts val="600"/>
+              </a:spcAft>
+              <a:buClr>
+                <a:srgbClr val="FFFFFF"/>
+              </a:buClr>
+              <a:buSzPts val="1100"/>
+              <a:buFont typeface="Dosis ExtraLight"/>
+              <a:buChar char="●"/>
+            </a:pPr>
+            <a:endParaRPr lang="en-US" sz="1600" dirty="0">
+              <a:solidFill>
+                <a:srgbClr val="FFFFFF"/>
+              </a:solidFill>
+              <a:latin typeface="Dosis ExtraLight"/>
+              <a:ea typeface="Dosis ExtraLight"/>
+              <a:cs typeface="Dosis ExtraLight"/>
+              <a:sym typeface="Dosis ExtraLight"/>
+            </a:endParaRPr>
+          </a:p>
+          <a:p>
+            <a:pPr lvl="0">
+              <a:spcAft>
+                <a:spcPts val="600"/>
+              </a:spcAft>
+              <a:buClr>
+                <a:srgbClr val="FFFFFF"/>
+              </a:buClr>
+              <a:buSzPts val="1100"/>
+              <a:buFont typeface="Dosis ExtraLight"/>
+              <a:buChar char="●"/>
+            </a:pPr>
+            <a:endParaRPr lang="en-US" sz="1600" dirty="0">
+              <a:solidFill>
+                <a:srgbClr val="FFFFFF"/>
+              </a:solidFill>
+              <a:latin typeface="Dosis ExtraLight"/>
+              <a:ea typeface="Dosis ExtraLight"/>
+              <a:cs typeface="Dosis ExtraLight"/>
+              <a:sym typeface="Dosis ExtraLight"/>
+            </a:endParaRPr>
+          </a:p>
+        </p:txBody>
+      </p:sp>
+    </p:spTree>
+    <p:extLst>
+      <p:ext uri="{BB962C8B-B14F-4D97-AF65-F5344CB8AC3E}">
+        <p14:creationId xmlns:p14="http://schemas.microsoft.com/office/powerpoint/2010/main" val="3606939682"/>
+      </p:ext>
+    </p:extLst>
+  </p:cSld>
+  <p:clrMapOvr>
+    <a:masterClrMapping/>
+  </p:clrMapOvr>
+</p:sld>
+</file>
+
+<file path=ppt/slides/slide6.xml><?xml version="1.0" encoding="utf-8"?>
+<p:sld xmlns:a="http://schemas.openxmlformats.org/drawingml/2006/main" xmlns:r="http://schemas.openxmlformats.org/officeDocument/2006/relationships" xmlns:p="http://schemas.openxmlformats.org/presentationml/2006/main">
+  <p:cSld>
+    <p:bg>
+      <p:bgPr>
+        <a:solidFill>
+          <a:schemeClr val="lt2"/>
+        </a:solidFill>
+        <a:effectLst/>
+      </p:bgPr>
+    </p:bg>
+    <p:spTree>
+      <p:nvGrpSpPr>
+        <p:cNvPr id="1" name="Shape 316"/>
+        <p:cNvGrpSpPr/>
+        <p:nvPr/>
+      </p:nvGrpSpPr>
+      <p:grpSpPr>
+        <a:xfrm>
+          <a:off x="0" y="0"/>
+          <a:ext cx="0" cy="0"/>
+          <a:chOff x="0" y="0"/>
+          <a:chExt cx="0" cy="0"/>
+        </a:xfrm>
+      </p:grpSpPr>
+      <p:sp>
+        <p:nvSpPr>
+          <p:cNvPr id="317" name="Google Shape;317;p22"/>
+          <p:cNvSpPr txBox="1">
+            <a:spLocks noGrp="1"/>
+          </p:cNvSpPr>
+          <p:nvPr>
+            <p:ph type="ctrTitle"/>
+          </p:nvPr>
+        </p:nvSpPr>
+        <p:spPr>
+          <a:xfrm>
+            <a:off x="0" y="0"/>
+            <a:ext cx="7264500" cy="504000"/>
+          </a:xfrm>
+          <a:prstGeom prst="rect">
+            <a:avLst/>
+          </a:prstGeom>
+        </p:spPr>
+        <p:txBody>
+          <a:bodyPr spcFirstLastPara="1" wrap="square" lIns="91425" tIns="91425" rIns="91425" bIns="91425" anchor="t" anchorCtr="0">
+            <a:noAutofit/>
+          </a:bodyPr>
+          <a:lstStyle/>
+          <a:p>
+            <a:pPr marL="0" lvl="0" indent="0" algn="l" rtl="0">
+              <a:spcBef>
+                <a:spcPts val="0"/>
+              </a:spcBef>
+              <a:spcAft>
+                <a:spcPts val="0"/>
+              </a:spcAft>
+              <a:buNone/>
+            </a:pPr>
+            <a:r>
+              <a:rPr lang="nl-NL" dirty="0"/>
+              <a:t>i</a:t>
+            </a:r>
+            <a:r>
+              <a:rPr lang="nl-BE" dirty="0" err="1"/>
+              <a:t>nterface</a:t>
             </a:r>
             <a:endParaRPr dirty="0"/>
           </a:p>
@@ -5066,10 +5477,10 @@
                 <a:cs typeface="Dosis ExtraLight"/>
                 <a:sym typeface="Dosis ExtraLight"/>
               </a:rPr>
-              <a:t>N</a:t>
-            </a:r>
-            <a:r>
-              <a:rPr lang="en-US" sz="1600" dirty="0" err="1" smtClean="0">
+              <a:t>NodeJs</a:t>
+            </a:r>
+            <a:r>
+              <a:rPr lang="en-US" sz="1600" dirty="0">
                 <a:solidFill>
                   <a:srgbClr val="FFFFFF"/>
                 </a:solidFill>
@@ -5078,10 +5489,23 @@
                 <a:cs typeface="Dosis ExtraLight"/>
                 <a:sym typeface="Dosis ExtraLight"/>
               </a:rPr>
-              <a:t>odeJs</a:t>
-            </a:r>
-            <a:r>
-              <a:rPr lang="en-US" sz="1600" dirty="0" smtClean="0">
+              <a:t> server op Raspberry pi</a:t>
+            </a:r>
+          </a:p>
+          <a:p>
+            <a:pPr lvl="0">
+              <a:spcAft>
+                <a:spcPts val="600"/>
+              </a:spcAft>
+              <a:buClr>
+                <a:srgbClr val="FFFFFF"/>
+              </a:buClr>
+              <a:buSzPts val="1100"/>
+              <a:buFont typeface="Dosis ExtraLight"/>
+              <a:buChar char="●"/>
+            </a:pPr>
+            <a:r>
+              <a:rPr lang="en-US" sz="1600" dirty="0">
                 <a:solidFill>
                   <a:srgbClr val="FFFFFF"/>
                 </a:solidFill>
@@ -5090,10 +5514,10 @@
                 <a:cs typeface="Dosis ExtraLight"/>
                 <a:sym typeface="Dosis ExtraLight"/>
               </a:rPr>
-              <a:t> server </a:t>
-            </a:r>
-            <a:r>
-              <a:rPr lang="en-US" sz="1600" dirty="0" err="1" smtClean="0">
+              <a:t>Data </a:t>
+            </a:r>
+            <a:r>
+              <a:rPr lang="en-US" sz="1600" dirty="0" err="1">
                 <a:solidFill>
                   <a:srgbClr val="FFFFFF"/>
                 </a:solidFill>
@@ -5102,10 +5526,10 @@
                 <a:cs typeface="Dosis ExtraLight"/>
                 <a:sym typeface="Dosis ExtraLight"/>
               </a:rPr>
-              <a:t>opgezet</a:t>
-            </a:r>
-            <a:r>
-              <a:rPr lang="en-US" sz="1600" dirty="0" smtClean="0">
+              <a:t>vqn</a:t>
+            </a:r>
+            <a:r>
+              <a:rPr lang="en-US" sz="1600" dirty="0">
                 <a:solidFill>
                   <a:srgbClr val="FFFFFF"/>
                 </a:solidFill>
@@ -5114,56 +5538,10 @@
                 <a:cs typeface="Dosis ExtraLight"/>
                 <a:sym typeface="Dosis ExtraLight"/>
               </a:rPr>
-              <a:t> op de Raspberry pi</a:t>
-            </a:r>
-          </a:p>
-          <a:p>
-            <a:pPr marL="158750" lvl="0" indent="0">
-              <a:spcAft>
-                <a:spcPts val="600"/>
-              </a:spcAft>
-              <a:buClr>
-                <a:srgbClr val="FFFFFF"/>
-              </a:buClr>
-              <a:buSzPts val="1100"/>
-              <a:buNone/>
-            </a:pPr>
-            <a:endParaRPr lang="en-US" sz="1600" dirty="0" smtClean="0">
-              <a:solidFill>
-                <a:srgbClr val="FFFFFF"/>
-              </a:solidFill>
-              <a:latin typeface="Dosis ExtraLight"/>
-              <a:ea typeface="Dosis ExtraLight"/>
-              <a:cs typeface="Dosis ExtraLight"/>
-              <a:sym typeface="Dosis ExtraLight"/>
-            </a:endParaRPr>
-          </a:p>
-          <a:p>
-            <a:pPr lvl="0">
-              <a:spcAft>
-                <a:spcPts val="600"/>
-              </a:spcAft>
-              <a:buClr>
-                <a:srgbClr val="FFFFFF"/>
-              </a:buClr>
-              <a:buSzPts val="1100"/>
-              <a:buFont typeface="Dosis ExtraLight"/>
-              <a:buChar char="●"/>
-            </a:pPr>
-            <a:r>
-              <a:rPr lang="en-US" sz="1600" dirty="0" smtClean="0">
-                <a:solidFill>
-                  <a:srgbClr val="FFFFFF"/>
-                </a:solidFill>
-                <a:latin typeface="Dosis ExtraLight"/>
-                <a:ea typeface="Dosis ExtraLight"/>
-                <a:cs typeface="Dosis ExtraLight"/>
-                <a:sym typeface="Dosis ExtraLight"/>
-              </a:rPr>
-              <a:t>Data van de test database via </a:t>
-            </a:r>
-            <a:r>
-              <a:rPr lang="en-US" sz="1600" dirty="0" err="1" smtClean="0">
+              <a:t> database via </a:t>
+            </a:r>
+            <a:r>
+              <a:rPr lang="en-US" sz="1600" dirty="0" err="1">
                 <a:solidFill>
                   <a:srgbClr val="FFFFFF"/>
                 </a:solidFill>
@@ -5175,7 +5553,7 @@
               <a:t>een</a:t>
             </a:r>
             <a:r>
-              <a:rPr lang="en-US" sz="1600" dirty="0" smtClean="0">
+              <a:rPr lang="en-US" sz="1600" dirty="0">
                 <a:solidFill>
                   <a:srgbClr val="FFFFFF"/>
                 </a:solidFill>
@@ -5187,7 +5565,7 @@
               <a:t> </a:t>
             </a:r>
             <a:r>
-              <a:rPr lang="en-US" sz="1600" dirty="0" err="1" smtClean="0">
+              <a:rPr lang="en-US" sz="1600" dirty="0" err="1">
                 <a:solidFill>
                   <a:srgbClr val="FFFFFF"/>
                 </a:solidFill>
@@ -5199,7 +5577,7 @@
               <a:t>nodeJs</a:t>
             </a:r>
             <a:r>
-              <a:rPr lang="en-US" sz="1600" dirty="0" smtClean="0">
+              <a:rPr lang="en-US" sz="1600" dirty="0">
                 <a:solidFill>
                   <a:srgbClr val="FFFFFF"/>
                 </a:solidFill>
@@ -5211,7 +5589,7 @@
               <a:t> script </a:t>
             </a:r>
             <a:r>
-              <a:rPr lang="en-US" sz="1600" dirty="0" err="1" smtClean="0">
+              <a:rPr lang="en-US" sz="1600" dirty="0" err="1">
                 <a:solidFill>
                   <a:srgbClr val="FFFFFF"/>
                 </a:solidFill>
@@ -5223,7 +5601,7 @@
               <a:t>ingelezen</a:t>
             </a:r>
             <a:r>
-              <a:rPr lang="en-US" sz="1600" dirty="0" smtClean="0">
+              <a:rPr lang="en-US" sz="1600" dirty="0">
                 <a:solidFill>
                   <a:srgbClr val="FFFFFF"/>
                 </a:solidFill>
@@ -5235,7 +5613,7 @@
               <a:t> </a:t>
             </a:r>
             <a:r>
-              <a:rPr lang="en-US" sz="1600" dirty="0" err="1" smtClean="0">
+              <a:rPr lang="en-US" sz="1600" dirty="0" err="1">
                 <a:solidFill>
                   <a:srgbClr val="FFFFFF"/>
                 </a:solidFill>
@@ -5247,7 +5625,104 @@
               <a:t>als</a:t>
             </a:r>
             <a:r>
-              <a:rPr lang="en-US" sz="1600" dirty="0" smtClean="0">
+              <a:rPr lang="en-US" sz="1600" dirty="0">
+                <a:solidFill>
+                  <a:srgbClr val="FFFFFF"/>
+                </a:solidFill>
+                <a:latin typeface="Dosis ExtraLight"/>
+                <a:ea typeface="Dosis ExtraLight"/>
+                <a:cs typeface="Dosis ExtraLight"/>
+                <a:sym typeface="Dosis ExtraLight"/>
+              </a:rPr>
+              <a:t> json format</a:t>
+            </a:r>
+          </a:p>
+          <a:p>
+            <a:pPr lvl="0">
+              <a:spcAft>
+                <a:spcPts val="600"/>
+              </a:spcAft>
+              <a:buClr>
+                <a:srgbClr val="FFFFFF"/>
+              </a:buClr>
+              <a:buSzPts val="1100"/>
+              <a:buFont typeface="Dosis ExtraLight"/>
+              <a:buChar char="●"/>
+            </a:pPr>
+            <a:r>
+              <a:rPr lang="en-US" sz="1600" dirty="0">
+                <a:solidFill>
+                  <a:srgbClr val="FFFFFF"/>
+                </a:solidFill>
+                <a:latin typeface="Dosis ExtraLight"/>
+                <a:ea typeface="Dosis ExtraLight"/>
+                <a:cs typeface="Dosis ExtraLight"/>
+                <a:sym typeface="Dosis ExtraLight"/>
+              </a:rPr>
+              <a:t>De </a:t>
+            </a:r>
+            <a:r>
+              <a:rPr lang="en-US" sz="1600" dirty="0" err="1">
+                <a:solidFill>
+                  <a:srgbClr val="FFFFFF"/>
+                </a:solidFill>
+                <a:latin typeface="Dosis ExtraLight"/>
+                <a:ea typeface="Dosis ExtraLight"/>
+                <a:cs typeface="Dosis ExtraLight"/>
+                <a:sym typeface="Dosis ExtraLight"/>
+              </a:rPr>
+              <a:t>json</a:t>
+            </a:r>
+            <a:r>
+              <a:rPr lang="en-US" sz="1600" dirty="0">
+                <a:solidFill>
+                  <a:srgbClr val="FFFFFF"/>
+                </a:solidFill>
+                <a:latin typeface="Dosis ExtraLight"/>
+                <a:ea typeface="Dosis ExtraLight"/>
+                <a:cs typeface="Dosis ExtraLight"/>
+                <a:sym typeface="Dosis ExtraLight"/>
+              </a:rPr>
+              <a:t> data </a:t>
+            </a:r>
+            <a:r>
+              <a:rPr lang="en-US" sz="1600" dirty="0" err="1">
+                <a:solidFill>
+                  <a:srgbClr val="FFFFFF"/>
+                </a:solidFill>
+                <a:latin typeface="Dosis ExtraLight"/>
+                <a:ea typeface="Dosis ExtraLight"/>
+                <a:cs typeface="Dosis ExtraLight"/>
+                <a:sym typeface="Dosis ExtraLight"/>
+              </a:rPr>
+              <a:t>geplot</a:t>
+            </a:r>
+            <a:r>
+              <a:rPr lang="en-US" sz="1600" dirty="0">
+                <a:solidFill>
+                  <a:srgbClr val="FFFFFF"/>
+                </a:solidFill>
+                <a:latin typeface="Dosis ExtraLight"/>
+                <a:ea typeface="Dosis ExtraLight"/>
+                <a:cs typeface="Dosis ExtraLight"/>
+                <a:sym typeface="Dosis ExtraLight"/>
+              </a:rPr>
+              <a:t> op </a:t>
+            </a:r>
+            <a:r>
+              <a:rPr lang="en-US" sz="1600" dirty="0" err="1">
+                <a:solidFill>
+                  <a:srgbClr val="FFFFFF"/>
+                </a:solidFill>
+                <a:latin typeface="Dosis ExtraLight"/>
+                <a:ea typeface="Dosis ExtraLight"/>
+                <a:cs typeface="Dosis ExtraLight"/>
+                <a:sym typeface="Dosis ExtraLight"/>
+              </a:rPr>
+              <a:t>een</a:t>
+            </a:r>
+            <a:r>
+              <a:rPr lang="en-US" sz="1600" dirty="0">
                 <a:solidFill>
                   <a:srgbClr val="FFFFFF"/>
                 </a:solidFill>
@@ -5259,149 +5734,7 @@
               <a:t> </a:t>
             </a:r>
             <a:r>
-              <a:rPr lang="en-US" sz="1600" dirty="0" err="1" smtClean="0">
-                <a:solidFill>
-                  <a:srgbClr val="FFFFFF"/>
-                </a:solidFill>
-                <a:latin typeface="Dosis ExtraLight"/>
-                <a:ea typeface="Dosis ExtraLight"/>
-                <a:cs typeface="Dosis ExtraLight"/>
-                <a:sym typeface="Dosis ExtraLight"/>
-              </a:rPr>
-              <a:t>json</a:t>
-            </a:r>
-            <a:r>
-              <a:rPr lang="en-US" sz="1600" dirty="0" smtClean="0">
-                <a:solidFill>
-                  <a:srgbClr val="FFFFFF"/>
-                </a:solidFill>
-                <a:latin typeface="Dosis ExtraLight"/>
-                <a:ea typeface="Dosis ExtraLight"/>
-                <a:cs typeface="Dosis ExtraLight"/>
-                <a:sym typeface="Dosis ExtraLight"/>
-              </a:rPr>
-              <a:t> format</a:t>
-            </a:r>
-          </a:p>
-          <a:p>
-            <a:pPr marL="158750" lvl="0" indent="0">
-              <a:spcAft>
-                <a:spcPts val="600"/>
-              </a:spcAft>
-              <a:buClr>
-                <a:srgbClr val="FFFFFF"/>
-              </a:buClr>
-              <a:buSzPts val="1100"/>
-              <a:buNone/>
-            </a:pPr>
-            <a:endParaRPr lang="en-US" sz="1600" dirty="0" smtClean="0">
-              <a:solidFill>
-                <a:srgbClr val="FFFFFF"/>
-              </a:solidFill>
-              <a:latin typeface="Dosis ExtraLight"/>
-              <a:ea typeface="Dosis ExtraLight"/>
-              <a:cs typeface="Dosis ExtraLight"/>
-              <a:sym typeface="Dosis ExtraLight"/>
-            </a:endParaRPr>
-          </a:p>
-          <a:p>
-            <a:pPr lvl="0">
-              <a:spcAft>
-                <a:spcPts val="600"/>
-              </a:spcAft>
-              <a:buClr>
-                <a:srgbClr val="FFFFFF"/>
-              </a:buClr>
-              <a:buSzPts val="1100"/>
-              <a:buFont typeface="Dosis ExtraLight"/>
-              <a:buChar char="●"/>
-            </a:pPr>
-            <a:r>
-              <a:rPr lang="en-US" sz="1600" dirty="0" smtClean="0">
-                <a:solidFill>
-                  <a:srgbClr val="FFFFFF"/>
-                </a:solidFill>
-                <a:latin typeface="Dosis ExtraLight"/>
-                <a:ea typeface="Dosis ExtraLight"/>
-                <a:cs typeface="Dosis ExtraLight"/>
-                <a:sym typeface="Dosis ExtraLight"/>
-              </a:rPr>
-              <a:t>De </a:t>
-            </a:r>
-            <a:r>
-              <a:rPr lang="en-US" sz="1600" dirty="0" err="1" smtClean="0">
-                <a:solidFill>
-                  <a:srgbClr val="FFFFFF"/>
-                </a:solidFill>
-                <a:latin typeface="Dosis ExtraLight"/>
-                <a:ea typeface="Dosis ExtraLight"/>
-                <a:cs typeface="Dosis ExtraLight"/>
-                <a:sym typeface="Dosis ExtraLight"/>
-              </a:rPr>
-              <a:t>json</a:t>
-            </a:r>
-            <a:r>
-              <a:rPr lang="en-US" sz="1600" dirty="0" smtClean="0">
-                <a:solidFill>
-                  <a:srgbClr val="FFFFFF"/>
-                </a:solidFill>
-                <a:latin typeface="Dosis ExtraLight"/>
-                <a:ea typeface="Dosis ExtraLight"/>
-                <a:cs typeface="Dosis ExtraLight"/>
-                <a:sym typeface="Dosis ExtraLight"/>
-              </a:rPr>
-              <a:t> data </a:t>
-            </a:r>
-            <a:r>
-              <a:rPr lang="en-US" sz="1600" dirty="0" err="1" smtClean="0">
-                <a:solidFill>
-                  <a:srgbClr val="FFFFFF"/>
-                </a:solidFill>
-                <a:latin typeface="Dosis ExtraLight"/>
-                <a:ea typeface="Dosis ExtraLight"/>
-                <a:cs typeface="Dosis ExtraLight"/>
-                <a:sym typeface="Dosis ExtraLight"/>
-              </a:rPr>
-              <a:t>geplot</a:t>
-            </a:r>
-            <a:r>
-              <a:rPr lang="en-US" sz="1600" dirty="0" smtClean="0">
-                <a:solidFill>
-                  <a:srgbClr val="FFFFFF"/>
-                </a:solidFill>
-                <a:latin typeface="Dosis ExtraLight"/>
-                <a:ea typeface="Dosis ExtraLight"/>
-                <a:cs typeface="Dosis ExtraLight"/>
-                <a:sym typeface="Dosis ExtraLight"/>
-              </a:rPr>
-              <a:t> op </a:t>
-            </a:r>
-            <a:r>
-              <a:rPr lang="en-US" sz="1600" dirty="0" err="1" smtClean="0">
-                <a:solidFill>
-                  <a:srgbClr val="FFFFFF"/>
-                </a:solidFill>
-                <a:latin typeface="Dosis ExtraLight"/>
-                <a:ea typeface="Dosis ExtraLight"/>
-                <a:cs typeface="Dosis ExtraLight"/>
-                <a:sym typeface="Dosis ExtraLight"/>
-              </a:rPr>
-              <a:t>een</a:t>
-            </a:r>
-            <a:r>
-              <a:rPr lang="en-US" sz="1600" dirty="0" smtClean="0">
-                <a:solidFill>
-                  <a:srgbClr val="FFFFFF"/>
-                </a:solidFill>
-                <a:latin typeface="Dosis ExtraLight"/>
-                <a:ea typeface="Dosis ExtraLight"/>
-                <a:cs typeface="Dosis ExtraLight"/>
-                <a:sym typeface="Dosis ExtraLight"/>
-              </a:rPr>
-              <a:t> </a:t>
-            </a:r>
-            <a:r>
-              <a:rPr lang="en-US" sz="1600" dirty="0" err="1" smtClean="0">
+              <a:rPr lang="en-US" sz="1600" dirty="0" err="1">
                 <a:solidFill>
                   <a:srgbClr val="FFFFFF"/>
                 </a:solidFill>
@@ -5412,7 +5745,7 @@
               </a:rPr>
               <a:t>wepgraph</a:t>
             </a:r>
-            <a:endParaRPr lang="en-US" sz="1600" dirty="0" smtClean="0">
+            <a:endParaRPr lang="en-US" sz="1600" dirty="0">
               <a:solidFill>
                 <a:srgbClr val="FFFFFF"/>
               </a:solidFill>
@@ -5456,7 +5789,7 @@
               <a:buNone/>
             </a:pPr>
             <a:r>
-              <a:rPr lang="en-US" sz="1600" dirty="0" smtClean="0">
+              <a:rPr lang="en-US" sz="1600" dirty="0">
                 <a:solidFill>
                   <a:srgbClr val="FFFFFF"/>
                 </a:solidFill>
@@ -5468,7 +5801,7 @@
               <a:t>Nog </a:t>
             </a:r>
             <a:r>
-              <a:rPr lang="en-US" sz="1600" dirty="0" err="1" smtClean="0">
+              <a:rPr lang="en-US" sz="1600" dirty="0" err="1">
                 <a:solidFill>
                   <a:srgbClr val="FFFFFF"/>
                 </a:solidFill>
@@ -5480,7 +5813,7 @@
               <a:t>te</a:t>
             </a:r>
             <a:r>
-              <a:rPr lang="en-US" sz="1600" dirty="0" smtClean="0">
+              <a:rPr lang="en-US" sz="1600" dirty="0">
                 <a:solidFill>
                   <a:srgbClr val="FFFFFF"/>
                 </a:solidFill>
@@ -5492,7 +5825,7 @@
               <a:t> </a:t>
             </a:r>
             <a:r>
-              <a:rPr lang="en-US" sz="1600" dirty="0" err="1" smtClean="0">
+              <a:rPr lang="en-US" sz="1600" dirty="0" err="1">
                 <a:solidFill>
                   <a:srgbClr val="FFFFFF"/>
                 </a:solidFill>
@@ -5503,7 +5836,7 @@
               </a:rPr>
               <a:t>doen</a:t>
             </a:r>
-            <a:endParaRPr lang="en-US" sz="1600" dirty="0" smtClean="0">
+            <a:endParaRPr lang="en-US" sz="1600" dirty="0">
               <a:solidFill>
                 <a:srgbClr val="FFFFFF"/>
               </a:solidFill>
@@ -5525,7 +5858,7 @@
               <a:buNone/>
             </a:pPr>
             <a:r>
-              <a:rPr lang="en-US" sz="1600" dirty="0" smtClean="0">
+              <a:rPr lang="en-US" sz="1600" dirty="0">
                 <a:solidFill>
                   <a:srgbClr val="FFFFFF"/>
                 </a:solidFill>
@@ -5537,7 +5870,7 @@
               <a:t>De </a:t>
             </a:r>
             <a:r>
-              <a:rPr lang="en-US" sz="1600" dirty="0" err="1" smtClean="0">
+              <a:rPr lang="en-US" sz="1600" dirty="0" err="1">
                 <a:solidFill>
                   <a:srgbClr val="FFFFFF"/>
                 </a:solidFill>
@@ -5549,7 +5882,7 @@
               <a:t>originele</a:t>
             </a:r>
             <a:r>
-              <a:rPr lang="en-US" sz="1600" dirty="0" smtClean="0">
+              <a:rPr lang="en-US" sz="1600" dirty="0">
                 <a:solidFill>
                   <a:srgbClr val="FFFFFF"/>
                 </a:solidFill>
@@ -5561,7 +5894,7 @@
               <a:t> data </a:t>
             </a:r>
             <a:r>
-              <a:rPr lang="en-US" sz="1600" dirty="0" err="1" smtClean="0">
+              <a:rPr lang="en-US" sz="1600" dirty="0" err="1">
                 <a:solidFill>
                   <a:srgbClr val="FFFFFF"/>
                 </a:solidFill>
@@ -5573,7 +5906,7 @@
               <a:t>inlezen</a:t>
             </a:r>
             <a:r>
-              <a:rPr lang="en-US" sz="1600" dirty="0" smtClean="0">
+              <a:rPr lang="en-US" sz="1600" dirty="0">
                 <a:solidFill>
                   <a:srgbClr val="FFFFFF"/>
                 </a:solidFill>
@@ -5585,7 +5918,7 @@
               <a:t> </a:t>
             </a:r>
             <a:r>
-              <a:rPr lang="en-US" sz="1600" dirty="0" err="1" smtClean="0">
+              <a:rPr lang="en-US" sz="1600" dirty="0" err="1">
                 <a:solidFill>
                   <a:srgbClr val="FFFFFF"/>
                 </a:solidFill>
@@ -5597,7 +5930,7 @@
               <a:t>en</a:t>
             </a:r>
             <a:r>
-              <a:rPr lang="en-US" sz="1600" dirty="0" smtClean="0">
+              <a:rPr lang="en-US" sz="1600" dirty="0">
                 <a:solidFill>
                   <a:srgbClr val="FFFFFF"/>
                 </a:solidFill>
@@ -5609,7 +5942,7 @@
               <a:t> </a:t>
             </a:r>
             <a:r>
-              <a:rPr lang="en-US" sz="1600" dirty="0" err="1" smtClean="0">
+              <a:rPr lang="en-US" sz="1600" dirty="0" err="1">
                 <a:solidFill>
                   <a:srgbClr val="FFFFFF"/>
                 </a:solidFill>
@@ -5621,7 +5954,7 @@
               <a:t>plotten</a:t>
             </a:r>
             <a:r>
-              <a:rPr lang="en-US" sz="1600" dirty="0" smtClean="0">
+              <a:rPr lang="en-US" sz="1600" dirty="0">
                 <a:solidFill>
                   <a:srgbClr val="FFFFFF"/>
                 </a:solidFill>
@@ -5633,7 +5966,7 @@
               <a:t> op </a:t>
             </a:r>
             <a:r>
-              <a:rPr lang="en-US" sz="1600" dirty="0" err="1" smtClean="0">
+              <a:rPr lang="en-US" sz="1600" dirty="0" err="1">
                 <a:solidFill>
                   <a:srgbClr val="FFFFFF"/>
                 </a:solidFill>
@@ -5645,7 +5978,7 @@
               <a:t>een</a:t>
             </a:r>
             <a:r>
-              <a:rPr lang="en-US" sz="1600" dirty="0" smtClean="0">
+              <a:rPr lang="en-US" sz="1600" dirty="0">
                 <a:solidFill>
                   <a:srgbClr val="FFFFFF"/>
                 </a:solidFill>
@@ -5657,7 +5990,7 @@
               <a:t> </a:t>
             </a:r>
             <a:r>
-              <a:rPr lang="en-US" sz="1600" smtClean="0">
+              <a:rPr lang="en-US" sz="1600" dirty="0" err="1">
                 <a:solidFill>
                   <a:srgbClr val="FFFFFF"/>
                 </a:solidFill>
@@ -5668,7 +6001,7 @@
               </a:rPr>
               <a:t>weppage</a:t>
             </a:r>
-            <a:endParaRPr lang="en-US" sz="1600" dirty="0" smtClean="0">
+            <a:endParaRPr lang="en-US" sz="1600" dirty="0">
               <a:solidFill>
                 <a:srgbClr val="FFFFFF"/>
               </a:solidFill>
@@ -5767,7 +6100,7 @@
     </p:spTree>
     <p:extLst>
       <p:ext uri="{BB962C8B-B14F-4D97-AF65-F5344CB8AC3E}">
-        <p14:creationId xmlns:p14="http://schemas.microsoft.com/office/powerpoint/2010/main" val="3606939682"/>
+        <p14:creationId xmlns:p14="http://schemas.microsoft.com/office/powerpoint/2010/main" val="991862853"/>
       </p:ext>
     </p:extLst>
   </p:cSld>
@@ -5777,7 +6110,7 @@
 </p:sld>
 </file>
 
-<file path=ppt/slides/slide6.xml><?xml version="1.0" encoding="utf-8"?>
+<file path=ppt/slides/slide7.xml><?xml version="1.0" encoding="utf-8"?>
 <p:sld xmlns:a="http://schemas.openxmlformats.org/drawingml/2006/main" xmlns:r="http://schemas.openxmlformats.org/officeDocument/2006/relationships" xmlns:p="http://schemas.openxmlformats.org/presentationml/2006/main">
   <p:cSld>
     <p:spTree>

</xml_diff>